<commit_message>
Line graphs, code refactoring
</commit_message>
<xml_diff>
--- a/analysis_presentation.pptx
+++ b/analysis_presentation.pptx
@@ -267,7 +267,7 @@
           <a:p>
             <a:fld id="{24C2F64E-3178-4F27-BD91-A54AA02EA10B}" type="datetimeFigureOut">
               <a:rPr lang="en-US" smtClean="0"/>
-              <a:t>8/30/2022</a:t>
+              <a:t>8/31/2022</a:t>
             </a:fld>
             <a:endParaRPr lang="en-US"/>
           </a:p>
@@ -465,7 +465,7 @@
           <a:p>
             <a:fld id="{24C2F64E-3178-4F27-BD91-A54AA02EA10B}" type="datetimeFigureOut">
               <a:rPr lang="en-US" smtClean="0"/>
-              <a:t>8/30/2022</a:t>
+              <a:t>8/31/2022</a:t>
             </a:fld>
             <a:endParaRPr lang="en-US"/>
           </a:p>
@@ -673,7 +673,7 @@
           <a:p>
             <a:fld id="{24C2F64E-3178-4F27-BD91-A54AA02EA10B}" type="datetimeFigureOut">
               <a:rPr lang="en-US" smtClean="0"/>
-              <a:t>8/30/2022</a:t>
+              <a:t>8/31/2022</a:t>
             </a:fld>
             <a:endParaRPr lang="en-US"/>
           </a:p>
@@ -871,7 +871,7 @@
           <a:p>
             <a:fld id="{24C2F64E-3178-4F27-BD91-A54AA02EA10B}" type="datetimeFigureOut">
               <a:rPr lang="en-US" smtClean="0"/>
-              <a:t>8/30/2022</a:t>
+              <a:t>8/31/2022</a:t>
             </a:fld>
             <a:endParaRPr lang="en-US"/>
           </a:p>
@@ -1146,7 +1146,7 @@
           <a:p>
             <a:fld id="{24C2F64E-3178-4F27-BD91-A54AA02EA10B}" type="datetimeFigureOut">
               <a:rPr lang="en-US" smtClean="0"/>
-              <a:t>8/30/2022</a:t>
+              <a:t>8/31/2022</a:t>
             </a:fld>
             <a:endParaRPr lang="en-US"/>
           </a:p>
@@ -1411,7 +1411,7 @@
           <a:p>
             <a:fld id="{24C2F64E-3178-4F27-BD91-A54AA02EA10B}" type="datetimeFigureOut">
               <a:rPr lang="en-US" smtClean="0"/>
-              <a:t>8/30/2022</a:t>
+              <a:t>8/31/2022</a:t>
             </a:fld>
             <a:endParaRPr lang="en-US"/>
           </a:p>
@@ -1823,7 +1823,7 @@
           <a:p>
             <a:fld id="{24C2F64E-3178-4F27-BD91-A54AA02EA10B}" type="datetimeFigureOut">
               <a:rPr lang="en-US" smtClean="0"/>
-              <a:t>8/30/2022</a:t>
+              <a:t>8/31/2022</a:t>
             </a:fld>
             <a:endParaRPr lang="en-US"/>
           </a:p>
@@ -1964,7 +1964,7 @@
           <a:p>
             <a:fld id="{24C2F64E-3178-4F27-BD91-A54AA02EA10B}" type="datetimeFigureOut">
               <a:rPr lang="en-US" smtClean="0"/>
-              <a:t>8/30/2022</a:t>
+              <a:t>8/31/2022</a:t>
             </a:fld>
             <a:endParaRPr lang="en-US"/>
           </a:p>
@@ -2077,7 +2077,7 @@
           <a:p>
             <a:fld id="{24C2F64E-3178-4F27-BD91-A54AA02EA10B}" type="datetimeFigureOut">
               <a:rPr lang="en-US" smtClean="0"/>
-              <a:t>8/30/2022</a:t>
+              <a:t>8/31/2022</a:t>
             </a:fld>
             <a:endParaRPr lang="en-US"/>
           </a:p>
@@ -2388,7 +2388,7 @@
           <a:p>
             <a:fld id="{24C2F64E-3178-4F27-BD91-A54AA02EA10B}" type="datetimeFigureOut">
               <a:rPr lang="en-US" smtClean="0"/>
-              <a:t>8/30/2022</a:t>
+              <a:t>8/31/2022</a:t>
             </a:fld>
             <a:endParaRPr lang="en-US"/>
           </a:p>
@@ -2676,7 +2676,7 @@
           <a:p>
             <a:fld id="{24C2F64E-3178-4F27-BD91-A54AA02EA10B}" type="datetimeFigureOut">
               <a:rPr lang="en-US" smtClean="0"/>
-              <a:t>8/30/2022</a:t>
+              <a:t>8/31/2022</a:t>
             </a:fld>
             <a:endParaRPr lang="en-US"/>
           </a:p>
@@ -2917,7 +2917,7 @@
           <a:p>
             <a:fld id="{24C2F64E-3178-4F27-BD91-A54AA02EA10B}" type="datetimeFigureOut">
               <a:rPr lang="en-US" smtClean="0"/>
-              <a:t>8/30/2022</a:t>
+              <a:t>8/31/2022</a:t>
             </a:fld>
             <a:endParaRPr lang="en-US"/>
           </a:p>

</xml_diff>